<commit_message>
vault backup: 2022-10-09 14:49:23
</commit_message>
<xml_diff>
--- a/Seminarfach/Präsentation.pptx
+++ b/Seminarfach/Präsentation.pptx
@@ -5,12 +5,13 @@
     <p:sldMasterId id="2147483648" r:id="rId1"/>
   </p:sldMasterIdLst>
   <p:notesMasterIdLst>
-    <p:notesMasterId r:id="rId7"/>
+    <p:notesMasterId r:id="rId8"/>
   </p:notesMasterIdLst>
   <p:sldIdLst>
     <p:sldId id="256" r:id="rId4"/>
     <p:sldId id="257" r:id="rId5"/>
     <p:sldId id="258" r:id="rId6"/>
+    <p:sldId id="259" r:id="rId7"/>
   </p:sldIdLst>
   <p:sldSz cx="12192000" cy="6858000"/>
   <p:notesSz cx="12192000" cy="6858000"/>
@@ -4872,6 +4873,128 @@
             <a:r>
               <a:rPr/>
               <a:t>Im Prozess</a:t>
+            </a:r>
+            <a:endParaRPr/>
+          </a:p>
+        </p:txBody>
+      </p:sp>
+    </p:spTree>
+  </p:cSld>
+  <p:clrMapOvr>
+    <a:masterClrMapping/>
+  </p:clrMapOvr>
+  <mc:AlternateContent xmlns:mc="http://schemas.openxmlformats.org/markup-compatibility/2006">
+    <mc:Choice xmlns:p14="http://schemas.microsoft.com/office/powerpoint/2010/main" Requires="p14">
+      <p:transition p14:dur="2000" advClick="1"/>
+    </mc:Choice>
+    <mc:Fallback>
+      <p:transition advClick="1"/>
+    </mc:Fallback>
+  </mc:AlternateContent>
+</p:sld>
+</file>
+
+<file path=ppt/slides/slide4.xml><?xml version="1.0" encoding="utf-8"?>
+<p:sld xmlns:a="http://schemas.openxmlformats.org/drawingml/2006/main" xmlns:r="http://schemas.openxmlformats.org/officeDocument/2006/relationships" xmlns:p="http://schemas.openxmlformats.org/presentationml/2006/main" xmlns:m="http://schemas.openxmlformats.org/officeDocument/2006/math" xmlns:w="http://schemas.openxmlformats.org/wordprocessingml/2006/main" showMasterPhAnim="0" show="1">
+  <p:cSld name="">
+    <p:spTree>
+      <p:nvGrpSpPr>
+        <p:cNvPr id="1" name=""/>
+        <p:cNvGrpSpPr/>
+        <p:nvPr/>
+      </p:nvGrpSpPr>
+      <p:grpSpPr bwMode="auto">
+        <a:xfrm>
+          <a:off x="0" y="0"/>
+          <a:ext cx="0" cy="0"/>
+          <a:chOff x="0" y="0"/>
+          <a:chExt cx="0" cy="0"/>
+        </a:xfrm>
+      </p:grpSpPr>
+      <p:sp>
+        <p:nvSpPr>
+          <p:cNvPr id="1205571290" name="Заголовок 1"/>
+          <p:cNvSpPr>
+            <a:spLocks noGrp="1"/>
+          </p:cNvSpPr>
+          <p:nvPr>
+            <p:ph type="title"/>
+          </p:nvPr>
+        </p:nvSpPr>
+        <p:spPr bwMode="auto"/>
+        <p:txBody>
+          <a:bodyPr/>
+          <a:lstStyle/>
+          <a:p>
+            <a:pPr>
+              <a:defRPr/>
+            </a:pPr>
+            <a:r>
+              <a:rPr/>
+              <a:t>Im Verhör</a:t>
+            </a:r>
+            <a:endParaRPr/>
+          </a:p>
+        </p:txBody>
+      </p:sp>
+      <p:sp>
+        <p:nvSpPr>
+          <p:cNvPr id="1691146995" name="Объект 2"/>
+          <p:cNvSpPr>
+            <a:spLocks noGrp="1"/>
+          </p:cNvSpPr>
+          <p:nvPr>
+            <p:ph idx="1"/>
+          </p:nvPr>
+        </p:nvSpPr>
+        <p:spPr bwMode="auto"/>
+        <p:txBody>
+          <a:bodyPr/>
+          <a:lstStyle/>
+          <a:p>
+            <a:pPr>
+              <a:defRPr/>
+            </a:pPr>
+            <a:r>
+              <a:rPr lang="de-DE" sz="3200" b="0" i="0" u="none" strike="noStrike" cap="none" spc="0">
+                <a:solidFill>
+                  <a:schemeClr val="tx1">
+                    <a:lumMod val="75000"/>
+                    <a:lumOff val="25000"/>
+                  </a:schemeClr>
+                </a:solidFill>
+                <a:latin typeface="Arial"/>
+                <a:cs typeface="Arial"/>
+              </a:rPr>
+              <a:t>Miranda Wahrnungen/Rechte</a:t>
+            </a:r>
+            <a:endParaRPr lang="de-DE" sz="3200" b="0" i="0" u="none" strike="noStrike" cap="none" spc="0">
+              <a:solidFill>
+                <a:schemeClr val="tx1">
+                  <a:lumMod val="75000"/>
+                  <a:lumOff val="25000"/>
+                </a:schemeClr>
+              </a:solidFill>
+              <a:latin typeface="Arial"/>
+              <a:cs typeface="Arial"/>
+            </a:endParaRPr>
+          </a:p>
+          <a:p>
+            <a:pPr lvl="1">
+              <a:defRPr/>
+            </a:pPr>
+            <a:r>
+              <a:rPr lang="de-DE" sz="2800" b="0" i="0" u="none" strike="noStrike" cap="none" spc="0">
+                <a:solidFill>
+                  <a:schemeClr val="tx1">
+                    <a:lumMod val="75000"/>
+                    <a:lumOff val="25000"/>
+                  </a:schemeClr>
+                </a:solidFill>
+                <a:latin typeface="Arial"/>
+                <a:cs typeface="Arial"/>
+              </a:rPr>
+              <a:t>1966 Mirand</a:t>
             </a:r>
             <a:endParaRPr/>
           </a:p>

</xml_diff>

<commit_message>
vault backup: 2022-10-09 15:09:25
</commit_message>
<xml_diff>
--- a/Seminarfach/Präsentation.pptx
+++ b/Seminarfach/Präsentation.pptx
@@ -720,7 +720,7 @@
         <p:spPr bwMode="auto">
           <a:xfrm>
             <a:off x="1309514" y="1839834"/>
-            <a:ext cx="4011787" cy="1314325"/>
+            <a:ext cx="4011787" cy="1314324"/>
           </a:xfrm>
           <a:custGeom>
             <a:avLst/>
@@ -810,7 +810,7 @@
         </p:nvSpPr>
         <p:spPr bwMode="auto">
           <a:xfrm>
-            <a:off x="6567031" y="4629133"/>
+            <a:off x="6567030" y="4629133"/>
             <a:ext cx="5395523" cy="2231707"/>
           </a:xfrm>
           <a:custGeom>
@@ -1055,7 +1055,7 @@
         <p:spPr bwMode="auto">
           <a:xfrm>
             <a:off x="4655839" y="2708919"/>
-            <a:ext cx="6720746" cy="720079"/>
+            <a:ext cx="6720745" cy="720079"/>
           </a:xfrm>
         </p:spPr>
         <p:txBody>
@@ -1252,7 +1252,7 @@
         <p:spPr bwMode="auto">
           <a:xfrm>
             <a:off x="4595833" y="1808820"/>
-            <a:ext cx="6720746" cy="720079"/>
+            <a:ext cx="6720745" cy="720079"/>
           </a:xfrm>
         </p:spPr>
         <p:txBody>
@@ -3893,7 +3893,7 @@
         </p:nvSpPr>
         <p:spPr bwMode="auto">
           <a:xfrm>
-            <a:off x="1637457" y="1"/>
+            <a:off x="1637456" y="1"/>
             <a:ext cx="3839633" cy="2609650"/>
           </a:xfrm>
           <a:custGeom>
@@ -4126,7 +4126,7 @@
         <p:spPr bwMode="auto">
           <a:xfrm>
             <a:off x="609599" y="6356351"/>
-            <a:ext cx="2844799" cy="365125"/>
+            <a:ext cx="2844798" cy="365125"/>
           </a:xfrm>
           <a:prstGeom prst="rect">
             <a:avLst/>
@@ -4210,7 +4210,7 @@
         <p:spPr bwMode="auto">
           <a:xfrm>
             <a:off x="8737599" y="6356351"/>
-            <a:ext cx="2844799" cy="365125"/>
+            <a:ext cx="2844798" cy="365125"/>
           </a:xfrm>
           <a:prstGeom prst="rect">
             <a:avLst/>
@@ -4587,7 +4587,7 @@
         <p:spPr bwMode="auto">
           <a:xfrm>
             <a:off x="4655839" y="3182780"/>
-            <a:ext cx="6720746" cy="720079"/>
+            <a:ext cx="6720745" cy="720079"/>
           </a:xfrm>
         </p:spPr>
         <p:txBody>
@@ -4994,9 +4994,138 @@
                 <a:latin typeface="Arial"/>
                 <a:cs typeface="Arial"/>
               </a:rPr>
-              <a:t>1966 Mirand</a:t>
-            </a:r>
-            <a:endParaRPr/>
+              <a:t>1966 Miranda v. Arizonna</a:t>
+            </a:r>
+            <a:endParaRPr lang="de-DE" sz="2800" b="0" i="0" u="none" strike="noStrike" cap="none" spc="0">
+              <a:solidFill>
+                <a:schemeClr val="tx1">
+                  <a:lumMod val="75000"/>
+                  <a:lumOff val="25000"/>
+                </a:schemeClr>
+              </a:solidFill>
+              <a:latin typeface="Arial"/>
+              <a:cs typeface="Arial"/>
+            </a:endParaRPr>
+          </a:p>
+          <a:p>
+            <a:pPr lvl="1">
+              <a:defRPr/>
+            </a:pPr>
+            <a:r>
+              <a:rPr lang="de-DE" sz="2800" b="0" i="0" u="none" strike="noStrike" cap="none" spc="0">
+                <a:solidFill>
+                  <a:schemeClr val="tx1">
+                    <a:lumMod val="75000"/>
+                    <a:lumOff val="25000"/>
+                  </a:schemeClr>
+                </a:solidFill>
+                <a:latin typeface="Arial"/>
+                <a:cs typeface="Arial"/>
+              </a:rPr>
+              <a:t>Recht zu Schweigen</a:t>
+            </a:r>
+            <a:endParaRPr lang="de-DE" sz="2800" b="0" i="0" u="none" strike="noStrike" cap="none" spc="0">
+              <a:solidFill>
+                <a:schemeClr val="tx1">
+                  <a:lumMod val="75000"/>
+                  <a:lumOff val="25000"/>
+                </a:schemeClr>
+              </a:solidFill>
+              <a:latin typeface="Arial"/>
+              <a:cs typeface="Arial"/>
+            </a:endParaRPr>
+          </a:p>
+          <a:p>
+            <a:pPr lvl="1">
+              <a:defRPr/>
+            </a:pPr>
+            <a:r>
+              <a:rPr lang="de-DE" sz="2800" b="0" i="0" u="none" strike="noStrike" cap="none" spc="0">
+                <a:solidFill>
+                  <a:schemeClr val="tx1">
+                    <a:lumMod val="75000"/>
+                    <a:lumOff val="25000"/>
+                  </a:schemeClr>
+                </a:solidFill>
+                <a:latin typeface="Arial"/>
+                <a:cs typeface="Arial"/>
+              </a:rPr>
+              <a:t>Recht auf einen Anwalt</a:t>
+            </a:r>
+            <a:endParaRPr lang="de-DE" sz="2800" b="0" i="0" u="none" strike="noStrike" cap="none" spc="0">
+              <a:solidFill>
+                <a:schemeClr val="tx1">
+                  <a:lumMod val="75000"/>
+                  <a:lumOff val="25000"/>
+                </a:schemeClr>
+              </a:solidFill>
+              <a:latin typeface="Arial"/>
+              <a:cs typeface="Arial"/>
+            </a:endParaRPr>
+          </a:p>
+          <a:p>
+            <a:pPr lvl="0">
+              <a:defRPr/>
+            </a:pPr>
+            <a:r>
+              <a:rPr lang="de-DE" sz="3200" b="0" i="0" u="none" strike="noStrike" cap="none" spc="0">
+                <a:solidFill>
+                  <a:schemeClr val="tx1">
+                    <a:lumMod val="75000"/>
+                    <a:lumOff val="25000"/>
+                  </a:schemeClr>
+                </a:solidFill>
+                <a:latin typeface="Arial"/>
+                <a:cs typeface="Arial"/>
+              </a:rPr>
+              <a:t>80% lehnen diese Rechte ab</a:t>
+            </a:r>
+            <a:endParaRPr lang="de-DE" sz="3200" b="0" i="0" u="none" strike="noStrike" cap="none" spc="0">
+              <a:solidFill>
+                <a:schemeClr val="tx1">
+                  <a:lumMod val="75000"/>
+                  <a:lumOff val="25000"/>
+                </a:schemeClr>
+              </a:solidFill>
+              <a:latin typeface="Arial"/>
+              <a:cs typeface="Arial"/>
+            </a:endParaRPr>
+          </a:p>
+          <a:p>
+            <a:pPr lvl="1">
+              <a:defRPr/>
+            </a:pPr>
+            <a:r>
+              <a:rPr lang="de-DE" sz="2800" b="0" i="0" u="none" strike="noStrike" cap="none" spc="0">
+                <a:solidFill>
+                  <a:schemeClr val="tx1">
+                    <a:lumMod val="75000"/>
+                    <a:lumOff val="25000"/>
+                  </a:schemeClr>
+                </a:solidFill>
+                <a:latin typeface="Arial"/>
+                <a:cs typeface="Arial"/>
+              </a:rPr>
+              <a:t>Rund die Hälfte von denen belastet sich selber</a:t>
+            </a:r>
+            <a:endParaRPr lang="de-DE" sz="2800" b="0" i="0" u="none" strike="noStrike" cap="none" spc="0">
+              <a:solidFill>
+                <a:schemeClr val="tx1">
+                  <a:lumMod val="75000"/>
+                  <a:lumOff val="25000"/>
+                </a:schemeClr>
+              </a:solidFill>
+              <a:latin typeface="Arial"/>
+              <a:cs typeface="Arial"/>
+            </a:endParaRPr>
+          </a:p>
+          <a:p>
+            <a:pPr marL="0" lvl="0" indent="0">
+              <a:buFont typeface="Arial"/>
+              <a:buNone/>
+              <a:defRPr/>
+            </a:pPr>
+            <a:endParaRPr lang="de-DE"/>
           </a:p>
         </p:txBody>
       </p:sp>

</xml_diff>

<commit_message>
vault backup: 2022-10-10 01:12:25
</commit_message>
<xml_diff>
--- a/Seminarfach/Präsentation.pptx
+++ b/Seminarfach/Präsentation.pptx
@@ -5,13 +5,18 @@
     <p:sldMasterId id="2147483648" r:id="rId1"/>
   </p:sldMasterIdLst>
   <p:notesMasterIdLst>
-    <p:notesMasterId r:id="rId8"/>
+    <p:notesMasterId r:id="rId13"/>
   </p:notesMasterIdLst>
   <p:sldIdLst>
     <p:sldId id="256" r:id="rId4"/>
     <p:sldId id="257" r:id="rId5"/>
     <p:sldId id="258" r:id="rId6"/>
     <p:sldId id="259" r:id="rId7"/>
+    <p:sldId id="260" r:id="rId8"/>
+    <p:sldId id="261" r:id="rId9"/>
+    <p:sldId id="262" r:id="rId10"/>
+    <p:sldId id="263" r:id="rId11"/>
+    <p:sldId id="264" r:id="rId12"/>
   </p:sldIdLst>
   <p:sldSz cx="12192000" cy="6858000"/>
   <p:notesSz cx="12192000" cy="6858000"/>
@@ -4556,7 +4561,12 @@
             <p:ph type="ctrTitle"/>
           </p:nvPr>
         </p:nvSpPr>
-        <p:spPr bwMode="auto"/>
+        <p:spPr bwMode="auto">
+          <a:xfrm flipH="0" flipV="0">
+            <a:off x="4595832" y="1560321"/>
+            <a:ext cx="6720744" cy="1622458"/>
+          </a:xfrm>
+        </p:spPr>
         <p:txBody>
           <a:bodyPr vertOverflow="overflow" horzOverflow="overflow" vert="horz" wrap="square" lIns="91440" tIns="45720" rIns="91440" bIns="45720" numCol="1" spcCol="0" rtlCol="0" fromWordArt="0" anchor="ctr" anchorCtr="0" forceAA="0" upright="0" compatLnSpc="0">
             <a:normAutofit fontScale="90000" lnSpcReduction="2000"/>
@@ -4568,7 +4578,7 @@
             </a:pPr>
             <a:r>
               <a:rPr lang="de-DE"/>
-              <a:t>Verschiedene formen der Ungerechtigkeit in der Amerikanischen Justiz</a:t>
+              <a:t>Verschiedene Formen der Ungerechtigkeit in der US-Amerikanischen Justiz</a:t>
             </a:r>
             <a:endParaRPr lang="de-DE"/>
           </a:p>
@@ -4661,6 +4671,70 @@
             <a:pPr>
               <a:defRPr/>
             </a:pPr>
+            <a:r>
+              <a:rPr/>
+              <a:t>Einleitung</a:t>
+            </a:r>
+            <a:endParaRPr/>
+          </a:p>
+          <a:p>
+            <a:pPr>
+              <a:defRPr/>
+            </a:pPr>
+            <a:r>
+              <a:rPr/>
+              <a:t>Im Verhör: Geständnisse und Selbstbelastung</a:t>
+            </a:r>
+            <a:endParaRPr/>
+          </a:p>
+          <a:p>
+            <a:pPr>
+              <a:defRPr/>
+            </a:pPr>
+            <a:r>
+              <a:rPr/>
+              <a:t>Im Verhör: Miranda</a:t>
+            </a:r>
+            <a:endParaRPr/>
+          </a:p>
+          <a:p>
+            <a:pPr>
+              <a:defRPr/>
+            </a:pPr>
+            <a:r>
+              <a:rPr/>
+              <a:t>Kaution</a:t>
+            </a:r>
+            <a:endParaRPr/>
+          </a:p>
+          <a:p>
+            <a:pPr>
+              <a:defRPr/>
+            </a:pPr>
+            <a:r>
+              <a:rPr/>
+              <a:t>Im Prozess</a:t>
+            </a:r>
+            <a:endParaRPr/>
+          </a:p>
+          <a:p>
+            <a:pPr>
+              <a:defRPr/>
+            </a:pPr>
+            <a:r>
+              <a:rPr/>
+              <a:t>Was getan wird</a:t>
+            </a:r>
+            <a:endParaRPr/>
+          </a:p>
+          <a:p>
+            <a:pPr>
+              <a:defRPr/>
+            </a:pPr>
+            <a:r>
+              <a:rPr/>
+              <a:t>Diskussion</a:t>
+            </a:r>
             <a:endParaRPr/>
           </a:p>
         </p:txBody>
@@ -4699,8 +4773,8 @@
         </p:nvSpPr>
         <p:spPr bwMode="auto">
           <a:xfrm flipH="0" flipV="0">
-            <a:off x="7864990" y="1600201"/>
-            <a:ext cx="3731809" cy="2286035"/>
+            <a:off x="7864989" y="1600200"/>
+            <a:ext cx="3732960" cy="2560355"/>
           </a:xfrm>
           <a:prstGeom prst="rect">
             <a:avLst/>
@@ -4727,7 +4801,7 @@
             </a:pPr>
             <a:r>
               <a:rPr/>
-              <a:t>Ich werde in dieser Präsentation an zwei Situationen in der Kriminalitätsaufklärung exemplarisch die Ungerechtigkeiten im US-Amerikanischen Justizsystem untersuchen.</a:t>
+              <a:t>Ich werde in dieser Präsentation an verschiedenen Situationen im Prozess der Kriminalitätsaufklärung exemplarisch die Ungerechtigkeiten im US-Amerikanischen Justizsystem untersuchen.</a:t>
             </a:r>
             <a:endParaRPr/>
           </a:p>
@@ -4872,6 +4946,16 @@
             </a:pPr>
             <a:r>
               <a:rPr/>
+              <a:t>Kaution</a:t>
+            </a:r>
+            <a:endParaRPr/>
+          </a:p>
+          <a:p>
+            <a:pPr lvl="1">
+              <a:defRPr/>
+            </a:pPr>
+            <a:r>
+              <a:rPr/>
               <a:t>Im Prozess</a:t>
             </a:r>
             <a:endParaRPr/>
@@ -4913,6 +4997,143 @@
       </p:grpSpPr>
       <p:sp>
         <p:nvSpPr>
+          <p:cNvPr id="1063379793" name="Заголовок 1"/>
+          <p:cNvSpPr>
+            <a:spLocks noGrp="1"/>
+          </p:cNvSpPr>
+          <p:nvPr>
+            <p:ph type="title"/>
+          </p:nvPr>
+        </p:nvSpPr>
+        <p:spPr bwMode="auto"/>
+        <p:txBody>
+          <a:bodyPr vertOverflow="overflow" horzOverflow="overflow" vert="horz" wrap="square" lIns="91440" tIns="45720" rIns="91440" bIns="45720" numCol="1" spcCol="0" rtlCol="0" fromWordArt="0" anchor="ctr" anchorCtr="0" forceAA="0" upright="0" compatLnSpc="0">
+            <a:normAutofit fontScale="90000" lnSpcReduction="2000"/>
+          </a:bodyPr>
+          <a:lstStyle/>
+          <a:p>
+            <a:pPr>
+              <a:defRPr/>
+            </a:pPr>
+            <a:r>
+              <a:rPr/>
+              <a:t>Im Verhör: Geständnisse und Selbstbelastung</a:t>
+            </a:r>
+            <a:endParaRPr/>
+          </a:p>
+        </p:txBody>
+      </p:sp>
+      <p:sp>
+        <p:nvSpPr>
+          <p:cNvPr id="383193620" name="Объект 2"/>
+          <p:cNvSpPr>
+            <a:spLocks noGrp="1"/>
+          </p:cNvSpPr>
+          <p:nvPr>
+            <p:ph idx="1"/>
+          </p:nvPr>
+        </p:nvSpPr>
+        <p:spPr bwMode="auto"/>
+        <p:txBody>
+          <a:bodyPr/>
+          <a:lstStyle/>
+          <a:p>
+            <a:pPr>
+              <a:defRPr/>
+            </a:pPr>
+            <a:r>
+              <a:rPr/>
+              <a:t>Ca. 50% aller Verurteilungen wurden mit Geständnissen erwirkt</a:t>
+            </a:r>
+            <a:endParaRPr/>
+          </a:p>
+          <a:p>
+            <a:pPr>
+              <a:defRPr/>
+            </a:pPr>
+            <a:r>
+              <a:rPr/>
+              <a:t>30 Staaten zeichnen das ganze Verhör auf</a:t>
+            </a:r>
+            <a:endParaRPr/>
+          </a:p>
+          <a:p>
+            <a:pPr>
+              <a:defRPr/>
+            </a:pPr>
+            <a:r>
+              <a:rPr/>
+              <a:t>Falsch Aussagen</a:t>
+            </a:r>
+            <a:endParaRPr/>
+          </a:p>
+          <a:p>
+            <a:pPr lvl="1">
+              <a:defRPr/>
+            </a:pPr>
+            <a:r>
+              <a:rPr/>
+              <a:t>62%-94% der durch DNA Analyse Freigesprochenen</a:t>
+            </a:r>
+            <a:endParaRPr/>
+          </a:p>
+          <a:p>
+            <a:pPr lvl="1">
+              <a:defRPr/>
+            </a:pPr>
+            <a:r>
+              <a:rPr/>
+              <a:t>36% unter 18 Jahre alt</a:t>
+            </a:r>
+            <a:endParaRPr/>
+          </a:p>
+          <a:p>
+            <a:pPr lvl="1">
+              <a:defRPr/>
+            </a:pPr>
+            <a:r>
+              <a:rPr/>
+              <a:t>70% mit geistigen Einschränkungen</a:t>
+            </a:r>
+            <a:endParaRPr/>
+          </a:p>
+        </p:txBody>
+      </p:sp>
+    </p:spTree>
+  </p:cSld>
+  <p:clrMapOvr>
+    <a:masterClrMapping/>
+  </p:clrMapOvr>
+  <mc:AlternateContent xmlns:mc="http://schemas.openxmlformats.org/markup-compatibility/2006">
+    <mc:Choice xmlns:p14="http://schemas.microsoft.com/office/powerpoint/2010/main" Requires="p14">
+      <p:transition p14:dur="2000" advClick="1"/>
+    </mc:Choice>
+    <mc:Fallback>
+      <p:transition advClick="1"/>
+    </mc:Fallback>
+  </mc:AlternateContent>
+</p:sld>
+</file>
+
+<file path=ppt/slides/slide5.xml><?xml version="1.0" encoding="utf-8"?>
+<p:sld xmlns:a="http://schemas.openxmlformats.org/drawingml/2006/main" xmlns:r="http://schemas.openxmlformats.org/officeDocument/2006/relationships" xmlns:p="http://schemas.openxmlformats.org/presentationml/2006/main" xmlns:m="http://schemas.openxmlformats.org/officeDocument/2006/math" xmlns:w="http://schemas.openxmlformats.org/wordprocessingml/2006/main" showMasterPhAnim="0" show="1">
+  <p:cSld name="">
+    <p:spTree>
+      <p:nvGrpSpPr>
+        <p:cNvPr id="1" name=""/>
+        <p:cNvGrpSpPr/>
+        <p:nvPr/>
+      </p:nvGrpSpPr>
+      <p:grpSpPr bwMode="auto">
+        <a:xfrm>
+          <a:off x="0" y="0"/>
+          <a:ext cx="0" cy="0"/>
+          <a:chOff x="0" y="0"/>
+          <a:chExt cx="0" cy="0"/>
+        </a:xfrm>
+      </p:grpSpPr>
+      <p:sp>
+        <p:nvSpPr>
           <p:cNvPr id="1205571290" name="Заголовок 1"/>
           <p:cNvSpPr>
             <a:spLocks noGrp="1"/>
@@ -4931,7 +5152,7 @@
             </a:pPr>
             <a:r>
               <a:rPr/>
-              <a:t>Im Verhör</a:t>
+              <a:t>Im Verhör: Miranda</a:t>
             </a:r>
             <a:endParaRPr/>
           </a:p>
@@ -4949,7 +5170,9 @@
         </p:nvSpPr>
         <p:spPr bwMode="auto"/>
         <p:txBody>
-          <a:bodyPr/>
+          <a:bodyPr vertOverflow="overflow" horzOverflow="overflow" vert="horz" wrap="square" lIns="91440" tIns="45720" rIns="91440" bIns="45720" numCol="1" spcCol="0" rtlCol="0" fromWordArt="0" anchor="t" anchorCtr="0" forceAA="0" upright="0" compatLnSpc="0">
+            <a:normAutofit fontScale="95000" lnSpcReduction="1000"/>
+          </a:bodyPr>
           <a:lstStyle/>
           <a:p>
             <a:pPr>
@@ -5120,12 +5343,617 @@
             </a:endParaRPr>
           </a:p>
           <a:p>
+            <a:pPr>
+              <a:defRPr/>
+            </a:pPr>
+            <a:r>
+              <a:rPr lang="de-DE" sz="3200" b="0" i="0" u="none" strike="noStrike" cap="none" spc="0">
+                <a:solidFill>
+                  <a:schemeClr val="tx1">
+                    <a:lumMod val="75000"/>
+                    <a:lumOff val="25000"/>
+                  </a:schemeClr>
+                </a:solidFill>
+                <a:latin typeface="+mn-lt"/>
+                <a:ea typeface="+mn-ea"/>
+                <a:cs typeface="+mn-cs"/>
+              </a:rPr>
+              <a:t>„Alles was sie sagen </a:t>
+            </a:r>
+            <a:r>
+              <a:rPr lang="de-DE" sz="3200" b="1" i="0" u="none" strike="noStrike" cap="none" spc="0">
+                <a:solidFill>
+                  <a:schemeClr val="tx1">
+                    <a:lumMod val="75000"/>
+                    <a:lumOff val="25000"/>
+                  </a:schemeClr>
+                </a:solidFill>
+                <a:latin typeface="+mn-lt"/>
+                <a:ea typeface="+mn-ea"/>
+                <a:cs typeface="+mn-cs"/>
+              </a:rPr>
+              <a:t>kann</a:t>
+            </a:r>
+            <a:r>
+              <a:rPr lang="de-DE" sz="3200" b="0" i="0" u="none" strike="noStrike" cap="none" spc="0">
+                <a:solidFill>
+                  <a:schemeClr val="tx1">
+                    <a:lumMod val="75000"/>
+                    <a:lumOff val="25000"/>
+                  </a:schemeClr>
+                </a:solidFill>
+                <a:latin typeface="+mn-lt"/>
+                <a:ea typeface="+mn-ea"/>
+                <a:cs typeface="+mn-cs"/>
+              </a:rPr>
+              <a:t>, und </a:t>
+            </a:r>
+            <a:r>
+              <a:rPr lang="de-DE" sz="3200" b="1" i="0" u="none" strike="noStrike" cap="none" spc="0">
+                <a:solidFill>
+                  <a:schemeClr val="tx1">
+                    <a:lumMod val="75000"/>
+                    <a:lumOff val="25000"/>
+                  </a:schemeClr>
+                </a:solidFill>
+                <a:latin typeface="+mn-lt"/>
+                <a:ea typeface="+mn-ea"/>
+                <a:cs typeface="+mn-cs"/>
+              </a:rPr>
+              <a:t>wird </a:t>
+            </a:r>
+            <a:r>
+              <a:rPr lang="de-DE" sz="3200" b="0" i="0" u="none" strike="noStrike" cap="none" spc="0">
+                <a:solidFill>
+                  <a:schemeClr val="tx1">
+                    <a:lumMod val="75000"/>
+                    <a:lumOff val="25000"/>
+                  </a:schemeClr>
+                </a:solidFill>
+                <a:latin typeface="+mn-lt"/>
+                <a:ea typeface="+mn-ea"/>
+                <a:cs typeface="+mn-cs"/>
+              </a:rPr>
+              <a:t>gegen sie vor Gericht verwendet.“</a:t>
+            </a:r>
+            <a:endParaRPr sz="3200"/>
+          </a:p>
+          <a:p>
             <a:pPr marL="0" lvl="0" indent="0">
               <a:buFont typeface="Arial"/>
               <a:buNone/>
               <a:defRPr/>
             </a:pPr>
+            <a:endParaRPr lang="de-DE" sz="2800" b="0" i="0" u="none" strike="noStrike" cap="none" spc="0">
+              <a:solidFill>
+                <a:schemeClr val="tx1">
+                  <a:lumMod val="75000"/>
+                  <a:lumOff val="25000"/>
+                </a:schemeClr>
+              </a:solidFill>
+              <a:latin typeface="Arial"/>
+              <a:cs typeface="Arial"/>
+            </a:endParaRPr>
+          </a:p>
+          <a:p>
+            <a:pPr marL="0" lvl="0" indent="0">
+              <a:buFont typeface="Arial"/>
+              <a:buNone/>
+              <a:defRPr/>
+            </a:pPr>
             <a:endParaRPr lang="de-DE"/>
+          </a:p>
+        </p:txBody>
+      </p:sp>
+    </p:spTree>
+  </p:cSld>
+  <p:clrMapOvr>
+    <a:masterClrMapping/>
+  </p:clrMapOvr>
+  <mc:AlternateContent xmlns:mc="http://schemas.openxmlformats.org/markup-compatibility/2006">
+    <mc:Choice xmlns:p14="http://schemas.microsoft.com/office/powerpoint/2010/main" Requires="p14">
+      <p:transition p14:dur="2000" advClick="1"/>
+    </mc:Choice>
+    <mc:Fallback>
+      <p:transition advClick="1"/>
+    </mc:Fallback>
+  </mc:AlternateContent>
+</p:sld>
+</file>
+
+<file path=ppt/slides/slide6.xml><?xml version="1.0" encoding="utf-8"?>
+<p:sld xmlns:a="http://schemas.openxmlformats.org/drawingml/2006/main" xmlns:r="http://schemas.openxmlformats.org/officeDocument/2006/relationships" xmlns:p="http://schemas.openxmlformats.org/presentationml/2006/main" xmlns:m="http://schemas.openxmlformats.org/officeDocument/2006/math" xmlns:w="http://schemas.openxmlformats.org/wordprocessingml/2006/main" showMasterPhAnim="0" show="1">
+  <p:cSld name="">
+    <p:spTree>
+      <p:nvGrpSpPr>
+        <p:cNvPr id="1" name=""/>
+        <p:cNvGrpSpPr/>
+        <p:nvPr/>
+      </p:nvGrpSpPr>
+      <p:grpSpPr bwMode="auto">
+        <a:xfrm>
+          <a:off x="0" y="0"/>
+          <a:ext cx="0" cy="0"/>
+          <a:chOff x="0" y="0"/>
+          <a:chExt cx="0" cy="0"/>
+        </a:xfrm>
+      </p:grpSpPr>
+      <p:sp>
+        <p:nvSpPr>
+          <p:cNvPr id="2088912118" name="Заголовок 1"/>
+          <p:cNvSpPr>
+            <a:spLocks noGrp="1"/>
+          </p:cNvSpPr>
+          <p:nvPr>
+            <p:ph type="title"/>
+          </p:nvPr>
+        </p:nvSpPr>
+        <p:spPr bwMode="auto"/>
+        <p:txBody>
+          <a:bodyPr/>
+          <a:lstStyle/>
+          <a:p>
+            <a:pPr>
+              <a:defRPr/>
+            </a:pPr>
+            <a:r>
+              <a:rPr/>
+              <a:t>Kaution</a:t>
+            </a:r>
+            <a:endParaRPr/>
+          </a:p>
+        </p:txBody>
+      </p:sp>
+      <p:sp>
+        <p:nvSpPr>
+          <p:cNvPr id="949458245" name="Объект 2"/>
+          <p:cNvSpPr>
+            <a:spLocks noGrp="1"/>
+          </p:cNvSpPr>
+          <p:nvPr>
+            <p:ph idx="1"/>
+          </p:nvPr>
+        </p:nvSpPr>
+        <p:spPr bwMode="auto"/>
+        <p:txBody>
+          <a:bodyPr/>
+          <a:lstStyle/>
+          <a:p>
+            <a:pPr>
+              <a:defRPr/>
+            </a:pPr>
+            <a:r>
+              <a:rPr/>
+              <a:t>Wer seine Kaution nicht bezahlen kann landet im Knast</a:t>
+            </a:r>
+            <a:endParaRPr/>
+          </a:p>
+          <a:p>
+            <a:pPr lvl="1">
+              <a:defRPr/>
+            </a:pPr>
+            <a:r>
+              <a:rPr/>
+              <a:t>40% der US-Amerikaner können nicht mal 400$ plötzlich schultern</a:t>
+            </a:r>
+            <a:endParaRPr/>
+          </a:p>
+          <a:p>
+            <a:pPr>
+              <a:defRPr/>
+            </a:pPr>
+            <a:r>
+              <a:rPr/>
+              <a:t>2013: 38.5% der Insassen in New Jersey</a:t>
+            </a:r>
+            <a:endParaRPr/>
+          </a:p>
+          <a:p>
+            <a:pPr>
+              <a:defRPr/>
+            </a:pPr>
+            <a:r>
+              <a:rPr/>
+              <a:t>Bail Bonds</a:t>
+            </a:r>
+            <a:endParaRPr/>
+          </a:p>
+          <a:p>
+            <a:pPr lvl="1">
+              <a:defRPr/>
+            </a:pPr>
+            <a:r>
+              <a:rPr/>
+              <a:t>In 18 Staaten kann fast jeder „Bounty Hunter“ werden</a:t>
+            </a:r>
+            <a:endParaRPr/>
+          </a:p>
+          <a:p>
+            <a:pPr lvl="1">
+              <a:defRPr/>
+            </a:pPr>
+            <a:r>
+              <a:rPr/>
+              <a:t>Diese haben unfassbar viele Rechte und wenig rechenschaftspflichtig  </a:t>
+            </a:r>
+            <a:endParaRPr/>
+          </a:p>
+          <a:p>
+            <a:pPr>
+              <a:defRPr/>
+            </a:pPr>
+            <a:endParaRPr/>
+          </a:p>
+        </p:txBody>
+      </p:sp>
+    </p:spTree>
+  </p:cSld>
+  <p:clrMapOvr>
+    <a:masterClrMapping/>
+  </p:clrMapOvr>
+  <mc:AlternateContent xmlns:mc="http://schemas.openxmlformats.org/markup-compatibility/2006">
+    <mc:Choice xmlns:p14="http://schemas.microsoft.com/office/powerpoint/2010/main" Requires="p14">
+      <p:transition p14:dur="2000" advClick="1"/>
+    </mc:Choice>
+    <mc:Fallback>
+      <p:transition advClick="1"/>
+    </mc:Fallback>
+  </mc:AlternateContent>
+</p:sld>
+</file>
+
+<file path=ppt/slides/slide7.xml><?xml version="1.0" encoding="utf-8"?>
+<p:sld xmlns:a="http://schemas.openxmlformats.org/drawingml/2006/main" xmlns:r="http://schemas.openxmlformats.org/officeDocument/2006/relationships" xmlns:p="http://schemas.openxmlformats.org/presentationml/2006/main" xmlns:m="http://schemas.openxmlformats.org/officeDocument/2006/math" xmlns:w="http://schemas.openxmlformats.org/wordprocessingml/2006/main" showMasterPhAnim="0" show="1">
+  <p:cSld name="">
+    <p:spTree>
+      <p:nvGrpSpPr>
+        <p:cNvPr id="1" name=""/>
+        <p:cNvGrpSpPr/>
+        <p:nvPr/>
+      </p:nvGrpSpPr>
+      <p:grpSpPr bwMode="auto">
+        <a:xfrm>
+          <a:off x="0" y="0"/>
+          <a:ext cx="0" cy="0"/>
+          <a:chOff x="0" y="0"/>
+          <a:chExt cx="0" cy="0"/>
+        </a:xfrm>
+      </p:grpSpPr>
+      <p:sp>
+        <p:nvSpPr>
+          <p:cNvPr id="1753284459" name="Заголовок 1"/>
+          <p:cNvSpPr>
+            <a:spLocks noGrp="1"/>
+          </p:cNvSpPr>
+          <p:nvPr>
+            <p:ph type="title"/>
+          </p:nvPr>
+        </p:nvSpPr>
+        <p:spPr bwMode="auto"/>
+        <p:txBody>
+          <a:bodyPr/>
+          <a:lstStyle/>
+          <a:p>
+            <a:pPr>
+              <a:defRPr/>
+            </a:pPr>
+            <a:r>
+              <a:rPr/>
+              <a:t>Im Prozess</a:t>
+            </a:r>
+            <a:endParaRPr/>
+          </a:p>
+        </p:txBody>
+      </p:sp>
+      <p:sp>
+        <p:nvSpPr>
+          <p:cNvPr id="808088720" name="Объект 2"/>
+          <p:cNvSpPr>
+            <a:spLocks noGrp="1"/>
+          </p:cNvSpPr>
+          <p:nvPr>
+            <p:ph idx="1"/>
+          </p:nvPr>
+        </p:nvSpPr>
+        <p:spPr bwMode="auto"/>
+        <p:txBody>
+          <a:bodyPr vertOverflow="overflow" horzOverflow="overflow" vert="horz" wrap="square" lIns="91440" tIns="45720" rIns="91440" bIns="45720" numCol="1" spcCol="0" rtlCol="0" fromWordArt="0" anchor="t" anchorCtr="0" forceAA="0" upright="0" compatLnSpc="0">
+            <a:normAutofit fontScale="85000" lnSpcReduction="3000"/>
+          </a:bodyPr>
+          <a:lstStyle/>
+          <a:p>
+            <a:pPr>
+              <a:defRPr/>
+            </a:pPr>
+            <a:r>
+              <a:rPr/>
+              <a:t>2003: 75.573 Fälle</a:t>
+            </a:r>
+            <a:endParaRPr/>
+          </a:p>
+          <a:p>
+            <a:pPr lvl="1">
+              <a:defRPr/>
+            </a:pPr>
+            <a:r>
+              <a:rPr/>
+              <a:t>Davon nur 5% vor Gericht – 95% nehmen Vergleiche an</a:t>
+            </a:r>
+            <a:r>
+              <a:rPr/>
+              <a:t> und lehnen ihr Recht auf einen fairen Prozess ab</a:t>
+            </a:r>
+            <a:endParaRPr/>
+          </a:p>
+          <a:p>
+            <a:pPr lvl="2">
+              <a:defRPr/>
+            </a:pPr>
+            <a:r>
+              <a:rPr/>
+              <a:t>Angst vor noch größeren Straffen</a:t>
+            </a:r>
+            <a:endParaRPr/>
+          </a:p>
+          <a:p>
+            <a:pPr lvl="2">
+              <a:defRPr/>
+            </a:pPr>
+            <a:r>
+              <a:rPr/>
+              <a:t>Mittlerweile Zentraler Teil der Justiz</a:t>
+            </a:r>
+            <a:endParaRPr/>
+          </a:p>
+          <a:p>
+            <a:pPr lvl="0">
+              <a:defRPr/>
+            </a:pPr>
+            <a:r>
+              <a:rPr/>
+              <a:t>Pflichtverteidiger sind häufig überarbeitet</a:t>
+            </a:r>
+            <a:endParaRPr/>
+          </a:p>
+          <a:p>
+            <a:pPr lvl="0">
+              <a:defRPr/>
+            </a:pPr>
+            <a:r>
+              <a:rPr/>
+              <a:t>Staatsanwälte überwältigen die Verteidigung sobald ein Prozess beginnt mit Akten</a:t>
+            </a:r>
+            <a:endParaRPr/>
+          </a:p>
+          <a:p>
+            <a:pPr lvl="0">
+              <a:defRPr/>
+            </a:pPr>
+            <a:endParaRPr/>
+          </a:p>
+          <a:p>
+            <a:pPr lvl="1">
+              <a:defRPr/>
+            </a:pPr>
+            <a:endParaRPr/>
+          </a:p>
+          <a:p>
+            <a:pPr lvl="0">
+              <a:defRPr/>
+            </a:pPr>
+            <a:endParaRPr/>
+          </a:p>
+          <a:p>
+            <a:pPr lvl="2">
+              <a:defRPr/>
+            </a:pPr>
+            <a:endParaRPr/>
+          </a:p>
+        </p:txBody>
+      </p:sp>
+    </p:spTree>
+  </p:cSld>
+  <p:clrMapOvr>
+    <a:masterClrMapping/>
+  </p:clrMapOvr>
+  <mc:AlternateContent xmlns:mc="http://schemas.openxmlformats.org/markup-compatibility/2006">
+    <mc:Choice xmlns:p14="http://schemas.microsoft.com/office/powerpoint/2010/main" Requires="p14">
+      <p:transition p14:dur="2000" advClick="1"/>
+    </mc:Choice>
+    <mc:Fallback>
+      <p:transition advClick="1"/>
+    </mc:Fallback>
+  </mc:AlternateContent>
+</p:sld>
+</file>
+
+<file path=ppt/slides/slide8.xml><?xml version="1.0" encoding="utf-8"?>
+<p:sld xmlns:a="http://schemas.openxmlformats.org/drawingml/2006/main" xmlns:r="http://schemas.openxmlformats.org/officeDocument/2006/relationships" xmlns:p="http://schemas.openxmlformats.org/presentationml/2006/main" xmlns:m="http://schemas.openxmlformats.org/officeDocument/2006/math" xmlns:w="http://schemas.openxmlformats.org/wordprocessingml/2006/main" showMasterPhAnim="0" show="1">
+  <p:cSld name="">
+    <p:spTree>
+      <p:nvGrpSpPr>
+        <p:cNvPr id="1" name=""/>
+        <p:cNvGrpSpPr/>
+        <p:nvPr/>
+      </p:nvGrpSpPr>
+      <p:grpSpPr bwMode="auto">
+        <a:xfrm>
+          <a:off x="0" y="0"/>
+          <a:ext cx="0" cy="0"/>
+          <a:chOff x="0" y="0"/>
+          <a:chExt cx="0" cy="0"/>
+        </a:xfrm>
+      </p:grpSpPr>
+      <p:sp>
+        <p:nvSpPr>
+          <p:cNvPr id="361511645" name="Заголовок 1"/>
+          <p:cNvSpPr>
+            <a:spLocks noGrp="1"/>
+          </p:cNvSpPr>
+          <p:nvPr>
+            <p:ph type="title"/>
+          </p:nvPr>
+        </p:nvSpPr>
+        <p:spPr bwMode="auto"/>
+        <p:txBody>
+          <a:bodyPr/>
+          <a:lstStyle/>
+          <a:p>
+            <a:pPr>
+              <a:defRPr/>
+            </a:pPr>
+            <a:r>
+              <a:rPr/>
+              <a:t>Was getan wird</a:t>
+            </a:r>
+            <a:endParaRPr/>
+          </a:p>
+        </p:txBody>
+      </p:sp>
+      <p:sp>
+        <p:nvSpPr>
+          <p:cNvPr id="530233282" name="Объект 2"/>
+          <p:cNvSpPr>
+            <a:spLocks noGrp="1"/>
+          </p:cNvSpPr>
+          <p:nvPr>
+            <p:ph idx="1"/>
+          </p:nvPr>
+        </p:nvSpPr>
+        <p:spPr bwMode="auto"/>
+        <p:txBody>
+          <a:bodyPr/>
+          <a:lstStyle/>
+          <a:p>
+            <a:pPr>
+              <a:defRPr/>
+            </a:pPr>
+            <a:r>
+              <a:rPr/>
+              <a:t>Zusammenfassend: Nicht genug</a:t>
+            </a:r>
+            <a:endParaRPr/>
+          </a:p>
+          <a:p>
+            <a:pPr>
+              <a:defRPr/>
+            </a:pPr>
+            <a:r>
+              <a:rPr/>
+              <a:t>NY hat Kaution teilweise mit Trail service ersetz</a:t>
+            </a:r>
+            <a:endParaRPr/>
+          </a:p>
+          <a:p>
+            <a:pPr>
+              <a:defRPr/>
+            </a:pPr>
+            <a:endParaRPr/>
+          </a:p>
+        </p:txBody>
+      </p:sp>
+    </p:spTree>
+  </p:cSld>
+  <p:clrMapOvr>
+    <a:masterClrMapping/>
+  </p:clrMapOvr>
+  <mc:AlternateContent xmlns:mc="http://schemas.openxmlformats.org/markup-compatibility/2006">
+    <mc:Choice xmlns:p14="http://schemas.microsoft.com/office/powerpoint/2010/main" Requires="p14">
+      <p:transition p14:dur="2000" advClick="1"/>
+    </mc:Choice>
+    <mc:Fallback>
+      <p:transition advClick="1"/>
+    </mc:Fallback>
+  </mc:AlternateContent>
+</p:sld>
+</file>
+
+<file path=ppt/slides/slide9.xml><?xml version="1.0" encoding="utf-8"?>
+<p:sld xmlns:a="http://schemas.openxmlformats.org/drawingml/2006/main" xmlns:r="http://schemas.openxmlformats.org/officeDocument/2006/relationships" xmlns:p="http://schemas.openxmlformats.org/presentationml/2006/main" xmlns:m="http://schemas.openxmlformats.org/officeDocument/2006/math" xmlns:w="http://schemas.openxmlformats.org/wordprocessingml/2006/main" showMasterPhAnim="0" show="1">
+  <p:cSld name="">
+    <p:spTree>
+      <p:nvGrpSpPr>
+        <p:cNvPr id="1" name=""/>
+        <p:cNvGrpSpPr/>
+        <p:nvPr/>
+      </p:nvGrpSpPr>
+      <p:grpSpPr bwMode="auto">
+        <a:xfrm>
+          <a:off x="0" y="0"/>
+          <a:ext cx="0" cy="0"/>
+          <a:chOff x="0" y="0"/>
+          <a:chExt cx="0" cy="0"/>
+        </a:xfrm>
+      </p:grpSpPr>
+      <p:sp>
+        <p:nvSpPr>
+          <p:cNvPr id="1402070162" name="Заголовок 1"/>
+          <p:cNvSpPr>
+            <a:spLocks noGrp="1"/>
+          </p:cNvSpPr>
+          <p:nvPr>
+            <p:ph type="title"/>
+          </p:nvPr>
+        </p:nvSpPr>
+        <p:spPr bwMode="auto"/>
+        <p:txBody>
+          <a:bodyPr/>
+          <a:lstStyle/>
+          <a:p>
+            <a:pPr>
+              <a:defRPr/>
+            </a:pPr>
+            <a:r>
+              <a:rPr/>
+              <a:t>Diskussion</a:t>
+            </a:r>
+            <a:endParaRPr/>
+          </a:p>
+        </p:txBody>
+      </p:sp>
+      <p:sp>
+        <p:nvSpPr>
+          <p:cNvPr id="1964116640" name="Объект 2"/>
+          <p:cNvSpPr>
+            <a:spLocks noGrp="1"/>
+          </p:cNvSpPr>
+          <p:nvPr>
+            <p:ph idx="1"/>
+          </p:nvPr>
+        </p:nvSpPr>
+        <p:spPr bwMode="auto"/>
+        <p:txBody>
+          <a:bodyPr/>
+          <a:lstStyle/>
+          <a:p>
+            <a:pPr>
+              <a:defRPr/>
+            </a:pPr>
+            <a:r>
+              <a:rPr/>
+              <a:t>Glaubt ihr Reform dieses Systems ist in einem umfassenden Maß möglich/nötig?</a:t>
+            </a:r>
+            <a:endParaRPr/>
+          </a:p>
+          <a:p>
+            <a:pPr>
+              <a:defRPr/>
+            </a:pPr>
+            <a:r>
+              <a:rPr/>
+              <a:t>Wie glaubt ihr ist die Situation in der BRD/EU im Vergleich zur USA?</a:t>
+            </a:r>
+            <a:endParaRPr/>
+          </a:p>
+          <a:p>
+            <a:pPr>
+              <a:defRPr/>
+            </a:pPr>
+            <a:r>
+              <a:rPr/>
+              <a:t>Je nach dem wie ihr zu dem Vergleich steht welche Schlüsse sollten wir in der BRD ziehen um die Gerechtigkeit hier zu erhalten / zu garantieren?</a:t>
+            </a:r>
+            <a:endParaRPr/>
           </a:p>
         </p:txBody>
       </p:sp>

</xml_diff>

<commit_message>
vault backup: 2022-10-12 08:42:16
</commit_message>
<xml_diff>
--- a/Seminarfach/Präsentation.pptx
+++ b/Seminarfach/Präsentation.pptx
@@ -4765,48 +4765,6 @@
           </a:p>
         </p:txBody>
       </p:sp>
-      <p:sp>
-        <p:nvSpPr>
-          <p:cNvPr id="1928921982" name=""/>
-          <p:cNvSpPr txBox="1"/>
-          <p:nvPr/>
-        </p:nvSpPr>
-        <p:spPr bwMode="auto">
-          <a:xfrm flipH="0" flipV="0">
-            <a:off x="7864989" y="1600200"/>
-            <a:ext cx="3732960" cy="2560355"/>
-          </a:xfrm>
-          <a:prstGeom prst="rect">
-            <a:avLst/>
-          </a:prstGeom>
-          <a:noFill/>
-        </p:spPr>
-        <p:txBody>
-          <a:bodyPr vertOverflow="overflow" horzOverflow="overflow" vert="horz" wrap="square" lIns="91440" tIns="45720" rIns="91440" bIns="45720" numCol="1" spcCol="0" rtlCol="0" fromWordArt="0" anchor="t" anchorCtr="0" forceAA="0" upright="0" compatLnSpc="0">
-            <a:spAutoFit/>
-          </a:bodyPr>
-          <a:p>
-            <a:pPr>
-              <a:defRPr/>
-            </a:pPr>
-            <a:r>
-              <a:rPr/>
-              <a:t>Abstrakt:</a:t>
-            </a:r>
-            <a:endParaRPr/>
-          </a:p>
-          <a:p>
-            <a:pPr>
-              <a:defRPr/>
-            </a:pPr>
-            <a:r>
-              <a:rPr/>
-              <a:t>Ich werde in dieser Präsentation an verschiedenen Situationen im Prozess der Kriminalitätsaufklärung exemplarisch die Ungerechtigkeiten im US-Amerikanischen Justizsystem untersuchen.</a:t>
-            </a:r>
-            <a:endParaRPr/>
-          </a:p>
-        </p:txBody>
-      </p:sp>
     </p:spTree>
   </p:cSld>
   <p:clrMapOvr>
@@ -5073,7 +5031,7 @@
             </a:pPr>
             <a:r>
               <a:rPr/>
-              <a:t>62%-94% der durch DNA Analyse Freigesprochenen</a:t>
+              <a:t>62%-94% der durch DNA-Analyse Freigesprochenen</a:t>
             </a:r>
             <a:endParaRPr/>
           </a:p>
@@ -5189,7 +5147,7 @@
                 <a:latin typeface="Arial"/>
                 <a:cs typeface="Arial"/>
               </a:rPr>
-              <a:t>Miranda Wahrnungen/Rechte</a:t>
+              <a:t>Miranda Warnungen/Rechte</a:t>
             </a:r>
             <a:endParaRPr lang="de-DE" sz="3200" b="0" i="0" u="none" strike="noStrike" cap="none" spc="0">
               <a:solidFill>
@@ -5786,7 +5744,7 @@
       </p:grpSpPr>
       <p:sp>
         <p:nvSpPr>
-          <p:cNvPr id="361511645" name="Заголовок 1"/>
+          <p:cNvPr id="1402070162" name="Заголовок 1"/>
           <p:cNvSpPr>
             <a:spLocks noGrp="1"/>
           </p:cNvSpPr>
@@ -5804,15 +5762,15 @@
             </a:pPr>
             <a:r>
               <a:rPr/>
-              <a:t>Was getan wird</a:t>
-            </a:r>
-            <a:endParaRPr/>
-          </a:p>
-        </p:txBody>
-      </p:sp>
-      <p:sp>
-        <p:nvSpPr>
-          <p:cNvPr id="530233282" name="Объект 2"/>
+              <a:t>Diskussion</a:t>
+            </a:r>
+            <a:endParaRPr/>
+          </a:p>
+        </p:txBody>
+      </p:sp>
+      <p:sp>
+        <p:nvSpPr>
+          <p:cNvPr id="1964116640" name="Объект 2"/>
           <p:cNvSpPr>
             <a:spLocks noGrp="1"/>
           </p:cNvSpPr>
@@ -5830,7 +5788,7 @@
             </a:pPr>
             <a:r>
               <a:rPr/>
-              <a:t>Zusammenfassend: Nicht genug</a:t>
+              <a:t>Glaubt ihr Reform dieses Systems ist in einem umfassenden Maß möglich/nötig?</a:t>
             </a:r>
             <a:endParaRPr/>
           </a:p>
@@ -5840,14 +5798,18 @@
             </a:pPr>
             <a:r>
               <a:rPr/>
-              <a:t>NY hat Kaution teilweise mit Trail service ersetz</a:t>
-            </a:r>
-            <a:endParaRPr/>
-          </a:p>
-          <a:p>
-            <a:pPr>
-              <a:defRPr/>
-            </a:pPr>
+              <a:t>Wie glaubt ihr ist die Situation in der BRD/EU im Vergleich zur USA?</a:t>
+            </a:r>
+            <a:endParaRPr/>
+          </a:p>
+          <a:p>
+            <a:pPr>
+              <a:defRPr/>
+            </a:pPr>
+            <a:r>
+              <a:rPr/>
+              <a:t>Je nach dem wie ihr zu dem Vergleich steht welche Schlüsse sollten wir in der BRD ziehen um die Gerechtigkeit hier zu erhalten / zu garantieren?</a:t>
+            </a:r>
             <a:endParaRPr/>
           </a:p>
         </p:txBody>
@@ -5887,7 +5849,7 @@
       </p:grpSpPr>
       <p:sp>
         <p:nvSpPr>
-          <p:cNvPr id="1402070162" name="Заголовок 1"/>
+          <p:cNvPr id="1775820426" name="Заголовок 1"/>
           <p:cNvSpPr>
             <a:spLocks noGrp="1"/>
           </p:cNvSpPr>
@@ -5905,15 +5867,15 @@
             </a:pPr>
             <a:r>
               <a:rPr/>
-              <a:t>Diskussion</a:t>
-            </a:r>
-            <a:endParaRPr/>
-          </a:p>
-        </p:txBody>
-      </p:sp>
-      <p:sp>
-        <p:nvSpPr>
-          <p:cNvPr id="1964116640" name="Объект 2"/>
+              <a:t>Quellen</a:t>
+            </a:r>
+            <a:endParaRPr/>
+          </a:p>
+        </p:txBody>
+      </p:sp>
+      <p:sp>
+        <p:nvSpPr>
+          <p:cNvPr id="1499228086" name="Объект 2"/>
           <p:cNvSpPr>
             <a:spLocks noGrp="1"/>
           </p:cNvSpPr>
@@ -5930,30 +5892,192 @@
               <a:defRPr/>
             </a:pPr>
             <a:r>
-              <a:rPr/>
-              <a:t>Glaubt ihr Reform dieses Systems ist in einem umfassenden Maß möglich/nötig?</a:t>
-            </a:r>
-            <a:endParaRPr/>
-          </a:p>
-          <a:p>
-            <a:pPr>
-              <a:defRPr/>
-            </a:pPr>
-            <a:r>
-              <a:rPr/>
-              <a:t>Wie glaubt ihr ist die Situation in der BRD/EU im Vergleich zur USA?</a:t>
-            </a:r>
-            <a:endParaRPr/>
-          </a:p>
-          <a:p>
-            <a:pPr>
-              <a:defRPr/>
-            </a:pPr>
-            <a:r>
-              <a:rPr/>
-              <a:t>Je nach dem wie ihr zu dem Vergleich steht welche Schlüsse sollten wir in der BRD ziehen um die Gerechtigkeit hier zu erhalten / zu garantieren?</a:t>
-            </a:r>
-            <a:endParaRPr/>
+              <a:rPr lang="de-DE" sz="3200" b="0" i="0" u="none" strike="noStrike" cap="none" spc="0">
+                <a:solidFill>
+                  <a:schemeClr val="tx1">
+                    <a:lumMod val="75000"/>
+                    <a:lumOff val="25000"/>
+                  </a:schemeClr>
+                </a:solidFill>
+                <a:latin typeface="Arial"/>
+                <a:cs typeface="Arial"/>
+              </a:rPr>
+              <a:t>Report on the Economic Well-Being </a:t>
+            </a:r>
+            <a:r>
+              <a:rPr lang="de-DE" sz="3200" b="0" i="0" u="none" strike="noStrike" cap="none" spc="0">
+                <a:solidFill>
+                  <a:schemeClr val="tx1">
+                    <a:lumMod val="75000"/>
+                    <a:lumOff val="25000"/>
+                  </a:schemeClr>
+                </a:solidFill>
+                <a:latin typeface="Arial"/>
+                <a:cs typeface="Arial"/>
+              </a:rPr>
+              <a:t>of U.S. Households in 2017</a:t>
+            </a:r>
+            <a:endParaRPr lang="de-DE" sz="3200" b="0" i="0" u="none" strike="noStrike" cap="none" spc="0">
+              <a:solidFill>
+                <a:schemeClr val="tx1">
+                  <a:lumMod val="75000"/>
+                  <a:lumOff val="25000"/>
+                </a:schemeClr>
+              </a:solidFill>
+              <a:latin typeface="Arial"/>
+              <a:cs typeface="Arial"/>
+            </a:endParaRPr>
+          </a:p>
+          <a:p>
+            <a:pPr>
+              <a:defRPr/>
+            </a:pPr>
+            <a:r>
+              <a:rPr lang="de-DE" sz="3200" b="0" i="0" u="none" strike="noStrike" cap="none" spc="0">
+                <a:solidFill>
+                  <a:schemeClr val="tx1">
+                    <a:lumMod val="75000"/>
+                    <a:lumOff val="25000"/>
+                  </a:schemeClr>
+                </a:solidFill>
+                <a:latin typeface="Arial"/>
+                <a:cs typeface="Arial"/>
+              </a:rPr>
+              <a:t>Age and mental status of exonerated </a:t>
+            </a:r>
+            <a:r>
+              <a:rPr lang="de-DE" sz="3200" b="0" i="0" u="none" strike="noStrike" cap="none" spc="0">
+                <a:solidFill>
+                  <a:schemeClr val="tx1">
+                    <a:lumMod val="75000"/>
+                    <a:lumOff val="25000"/>
+                  </a:schemeClr>
+                </a:solidFill>
+                <a:latin typeface="Arial"/>
+                <a:cs typeface="Arial"/>
+              </a:rPr>
+              <a:t>defendants who confessed</a:t>
+            </a:r>
+            <a:endParaRPr lang="de-DE" sz="3200" b="0" i="0" u="none" strike="noStrike" cap="none" spc="0">
+              <a:solidFill>
+                <a:schemeClr val="tx1">
+                  <a:lumMod val="75000"/>
+                  <a:lumOff val="25000"/>
+                </a:schemeClr>
+              </a:solidFill>
+              <a:latin typeface="Arial"/>
+              <a:cs typeface="Arial"/>
+            </a:endParaRPr>
+          </a:p>
+          <a:p>
+            <a:pPr>
+              <a:defRPr/>
+            </a:pPr>
+            <a:r>
+              <a:rPr lang="de-DE" sz="3200" b="0" i="0" u="none" strike="noStrike" cap="none" spc="0">
+                <a:solidFill>
+                  <a:schemeClr val="tx1">
+                    <a:lumMod val="75000"/>
+                    <a:lumOff val="25000"/>
+                  </a:schemeClr>
+                </a:solidFill>
+                <a:latin typeface="Arial"/>
+                <a:cs typeface="Arial"/>
+              </a:rPr>
+              <a:t>Miranda reasoning and competent waiver decisions: are models </a:t>
+            </a:r>
+            <a:r>
+              <a:rPr lang="de-DE" sz="3200" b="0" i="0" u="none" strike="noStrike" cap="none" spc="0">
+                <a:solidFill>
+                  <a:schemeClr val="tx1">
+                    <a:lumMod val="75000"/>
+                    <a:lumOff val="25000"/>
+                  </a:schemeClr>
+                </a:solidFill>
+                <a:latin typeface="Arial"/>
+                <a:cs typeface="Arial"/>
+              </a:rPr>
+              <a:t>of legal decision making applicable?</a:t>
+            </a:r>
+            <a:endParaRPr lang="de-DE" sz="3200" b="0" i="0" u="none" strike="noStrike" cap="none" spc="0">
+              <a:solidFill>
+                <a:schemeClr val="tx1">
+                  <a:lumMod val="75000"/>
+                  <a:lumOff val="25000"/>
+                </a:schemeClr>
+              </a:solidFill>
+              <a:latin typeface="Arial"/>
+              <a:cs typeface="Arial"/>
+            </a:endParaRPr>
+          </a:p>
+          <a:p>
+            <a:pPr>
+              <a:defRPr/>
+            </a:pPr>
+            <a:r>
+              <a:rPr lang="de-DE" sz="3200" b="0" i="0" u="none" strike="noStrike" cap="none" spc="0">
+                <a:solidFill>
+                  <a:schemeClr val="tx1">
+                    <a:lumMod val="75000"/>
+                    <a:lumOff val="25000"/>
+                  </a:schemeClr>
+                </a:solidFill>
+                <a:latin typeface="Arial"/>
+                <a:cs typeface="Arial"/>
+              </a:rPr>
+              <a:t>contaminated confessions revisited</a:t>
+            </a:r>
+            <a:endParaRPr lang="de-DE" sz="3200" b="0" i="0" u="none" strike="noStrike" cap="none" spc="0">
+              <a:solidFill>
+                <a:schemeClr val="tx1">
+                  <a:lumMod val="75000"/>
+                  <a:lumOff val="25000"/>
+                </a:schemeClr>
+              </a:solidFill>
+              <a:latin typeface="Arial"/>
+              <a:cs typeface="Arial"/>
+            </a:endParaRPr>
+          </a:p>
+          <a:p>
+            <a:pPr>
+              <a:defRPr/>
+            </a:pPr>
+            <a:r>
+              <a:rPr lang="de-DE" sz="3200" b="0" i="0" u="none" strike="noStrike" cap="none" spc="0">
+                <a:solidFill>
+                  <a:schemeClr val="tx1">
+                    <a:lumMod val="75000"/>
+                    <a:lumOff val="25000"/>
+                  </a:schemeClr>
+                </a:solidFill>
+                <a:latin typeface="Arial"/>
+                <a:cs typeface="Arial"/>
+              </a:rPr>
+              <a:t>Plea and Charge </a:t>
+            </a:r>
+            <a:r>
+              <a:rPr lang="de-DE" sz="3200" b="0" i="0" u="none" strike="noStrike" cap="none" spc="0">
+                <a:solidFill>
+                  <a:schemeClr val="tx1">
+                    <a:lumMod val="75000"/>
+                    <a:lumOff val="25000"/>
+                  </a:schemeClr>
+                </a:solidFill>
+                <a:latin typeface="Arial"/>
+                <a:cs typeface="Arial"/>
+              </a:rPr>
+              <a:t>Bargaining</a:t>
+            </a:r>
+            <a:endParaRPr lang="de-DE" sz="3200" b="0" i="0" u="none" strike="noStrike" cap="none" spc="0">
+              <a:solidFill>
+                <a:schemeClr val="tx1">
+                  <a:lumMod val="75000"/>
+                  <a:lumOff val="25000"/>
+                </a:schemeClr>
+              </a:solidFill>
+              <a:latin typeface="Arial"/>
+              <a:cs typeface="Arial"/>
+            </a:endParaRPr>
           </a:p>
         </p:txBody>
       </p:sp>

</xml_diff>